<commit_message>
minor fixes container_apps slides
</commit_message>
<xml_diff>
--- a/ppt/container_apps-devops-ulpgc.pptx
+++ b/ppt/container_apps-devops-ulpgc.pptx
@@ -5,10 +5,10 @@
     <p:sldMasterId id="2147483678" r:id="rId4"/>
   </p:sldMasterIdLst>
   <p:notesMasterIdLst>
-    <p:notesMasterId r:id="rId51"/>
+    <p:notesMasterId r:id="rId53"/>
   </p:notesMasterIdLst>
   <p:handoutMasterIdLst>
-    <p:handoutMasterId r:id="rId52"/>
+    <p:handoutMasterId r:id="rId54"/>
   </p:handoutMasterIdLst>
   <p:sldIdLst>
     <p:sldId id="302" r:id="rId5"/>
@@ -45,48 +45,45 @@
     <p:sldId id="1307" r:id="rId36"/>
     <p:sldId id="1302" r:id="rId37"/>
     <p:sldId id="1309" r:id="rId38"/>
-    <p:sldId id="1289" r:id="rId39"/>
-    <p:sldId id="1292" r:id="rId40"/>
-    <p:sldId id="1297" r:id="rId41"/>
-    <p:sldId id="1294" r:id="rId42"/>
-    <p:sldId id="1308" r:id="rId43"/>
-    <p:sldId id="1298" r:id="rId44"/>
-    <p:sldId id="1303" r:id="rId45"/>
-    <p:sldId id="1304" r:id="rId46"/>
-    <p:sldId id="1311" r:id="rId47"/>
-    <p:sldId id="1310" r:id="rId48"/>
-    <p:sldId id="1305" r:id="rId49"/>
-    <p:sldId id="1255" r:id="rId50"/>
+    <p:sldId id="1321" r:id="rId39"/>
+    <p:sldId id="1289" r:id="rId40"/>
+    <p:sldId id="1322" r:id="rId41"/>
+    <p:sldId id="1292" r:id="rId42"/>
+    <p:sldId id="1297" r:id="rId43"/>
+    <p:sldId id="1294" r:id="rId44"/>
+    <p:sldId id="1308" r:id="rId45"/>
+    <p:sldId id="1298" r:id="rId46"/>
+    <p:sldId id="1303" r:id="rId47"/>
+    <p:sldId id="1304" r:id="rId48"/>
+    <p:sldId id="1311" r:id="rId49"/>
+    <p:sldId id="1310" r:id="rId50"/>
+    <p:sldId id="1305" r:id="rId51"/>
+    <p:sldId id="1255" r:id="rId52"/>
   </p:sldIdLst>
   <p:sldSz cx="9144000" cy="5143500" type="screen16x9"/>
   <p:notesSz cx="6858000" cy="9144000"/>
   <p:embeddedFontLst>
     <p:embeddedFont>
       <p:font typeface="Arial Black" panose="020B0A04020102020204" pitchFamily="34" charset="0"/>
-      <p:bold r:id="rId53"/>
+      <p:bold r:id="rId55"/>
     </p:embeddedFont>
     <p:embeddedFont>
       <p:font typeface="Century Gothic" panose="020B0502020202020204" pitchFamily="34" charset="0"/>
-      <p:regular r:id="rId53"/>
-      <p:bold r:id="rId53"/>
-      <p:italic r:id="rId53"/>
-      <p:boldItalic r:id="rId53"/>
+      <p:regular r:id="rId55"/>
+      <p:bold r:id="rId55"/>
+      <p:italic r:id="rId55"/>
+      <p:boldItalic r:id="rId55"/>
     </p:embeddedFont>
     <p:embeddedFont>
       <p:font typeface="Consolas" panose="020B0609020204030204" pitchFamily="49" charset="0"/>
-      <p:regular r:id="rId54"/>
-      <p:bold r:id="rId55"/>
-      <p:italic r:id="rId56"/>
-      <p:boldItalic r:id="rId57"/>
-    </p:embeddedFont>
-    <p:embeddedFont>
-      <p:font typeface="Montserrat ExtraBold" panose="00000900000000000000" pitchFamily="2" charset="0"/>
-      <p:bold r:id="rId53"/>
-      <p:boldItalic r:id="rId53"/>
+      <p:regular r:id="rId56"/>
+      <p:bold r:id="rId57"/>
+      <p:italic r:id="rId58"/>
+      <p:boldItalic r:id="rId59"/>
     </p:embeddedFont>
     <p:embeddedFont>
       <p:font typeface="Ramabhadra"/>
-      <p:regular r:id="rId53"/>
+      <p:regular r:id="rId55"/>
     </p:embeddedFont>
   </p:embeddedFontLst>
   <p:defaultTextStyle>
@@ -2549,7 +2546,7 @@
           <a:p>
             <a:fld id="{4A3B785F-1BCE-1A46-9CAA-77ACC7103834}" type="datetimeFigureOut">
               <a:rPr lang="es-ES" smtClean="0"/>
-              <a:t>02/03/2023</a:t>
+              <a:t>21/02/2024</a:t>
             </a:fld>
             <a:endParaRPr lang="es-ES" dirty="0"/>
           </a:p>
@@ -11702,7 +11699,7 @@
           <a:p>
             <a:r>
               <a:rPr lang="es-ES" dirty="0"/>
-              <a:t>Antes de usar una proveedor de recursos, este debe registrarse para el proveedor de recursos</a:t>
+              <a:t>Antes de usar un proveedor de recursos, la suscripción debe estar registrada para dicho proveedor de recursos</a:t>
             </a:r>
           </a:p>
           <a:p>
@@ -12665,7 +12662,7 @@
               <a:rPr lang="en-US" dirty="0" err="1">
                 <a:latin typeface="Consolas" panose="020B0609020204030204" pitchFamily="49" charset="0"/>
               </a:rPr>
-              <a:t>westeurope</a:t>
+              <a:t>northeurope</a:t>
             </a:r>
             <a:endParaRPr lang="es-ES" dirty="0">
               <a:latin typeface="Consolas" panose="020B0609020204030204" pitchFamily="49" charset="0"/>
@@ -13876,7 +13873,7 @@
               <a:rPr lang="en-US" dirty="0" err="1">
                 <a:latin typeface="Consolas" panose="020B0609020204030204" pitchFamily="49" charset="0"/>
               </a:rPr>
-              <a:t>westeurope</a:t>
+              <a:t>northeurope</a:t>
             </a:r>
             <a:endParaRPr lang="en-US" dirty="0">
               <a:latin typeface="Consolas" panose="020B0609020204030204" pitchFamily="49" charset="0"/>
@@ -14466,8 +14463,8 @@
         </p:nvSpPr>
         <p:spPr>
           <a:xfrm>
-            <a:off x="2233868" y="1622555"/>
-            <a:ext cx="4686794" cy="3323987"/>
+            <a:off x="1561821" y="1461413"/>
+            <a:ext cx="5653261" cy="3754874"/>
           </a:xfrm>
           <a:prstGeom prst="rect">
             <a:avLst/>
@@ -14556,7 +14553,7 @@
               <a:rPr lang="en-US" dirty="0" err="1">
                 <a:latin typeface="Consolas" panose="020B0609020204030204" pitchFamily="49" charset="0"/>
               </a:rPr>
-              <a:t>westeurope</a:t>
+              <a:t>northeurope</a:t>
             </a:r>
             <a:r>
               <a:rPr lang="en-US" dirty="0">
@@ -14783,6 +14780,65 @@
             </a:r>
             <a:endParaRPr lang="en-US" dirty="0">
               <a:latin typeface="Consolas" panose="020B0609020204030204" pitchFamily="49" charset="0"/>
+            </a:endParaRPr>
+          </a:p>
+          <a:p>
+            <a:endParaRPr lang="en-US" dirty="0">
+              <a:latin typeface="Consolas" panose="020B0609020204030204" pitchFamily="49" charset="0"/>
+            </a:endParaRPr>
+          </a:p>
+          <a:p>
+            <a:pPr algn="ctr"/>
+            <a:r>
+              <a:rPr lang="en-US" i="1" dirty="0">
+                <a:latin typeface="+mn-lt"/>
+              </a:rPr>
+              <a:t>No </a:t>
+            </a:r>
+            <a:r>
+              <a:rPr lang="en-US" i="1" dirty="0" err="1">
+                <a:latin typeface="+mn-lt"/>
+              </a:rPr>
+              <a:t>olvides</a:t>
+            </a:r>
+            <a:r>
+              <a:rPr lang="en-US" i="1" dirty="0">
+                <a:latin typeface="+mn-lt"/>
+              </a:rPr>
+              <a:t> </a:t>
+            </a:r>
+            <a:r>
+              <a:rPr lang="en-US" i="1" dirty="0" err="1">
+                <a:latin typeface="+mn-lt"/>
+              </a:rPr>
+              <a:t>actualizar</a:t>
+            </a:r>
+            <a:r>
+              <a:rPr lang="en-US" i="1" dirty="0">
+                <a:latin typeface="+mn-lt"/>
+              </a:rPr>
+              <a:t> las </a:t>
+            </a:r>
+            <a:r>
+              <a:rPr lang="en-US" i="1" dirty="0" err="1">
+                <a:latin typeface="+mn-lt"/>
+              </a:rPr>
+              <a:t>propiedades</a:t>
+            </a:r>
+            <a:r>
+              <a:rPr lang="en-US" i="1" dirty="0">
+                <a:latin typeface="+mn-lt"/>
+              </a:rPr>
+              <a:t> de la </a:t>
+            </a:r>
+            <a:r>
+              <a:rPr lang="en-US" i="1" dirty="0" err="1">
+                <a:latin typeface="+mn-lt"/>
+              </a:rPr>
+              <a:t>aplicación</a:t>
+            </a:r>
+            <a:endParaRPr lang="en-US" i="1" dirty="0">
+              <a:latin typeface="+mn-lt"/>
             </a:endParaRPr>
           </a:p>
         </p:txBody>
@@ -15640,12 +15696,8 @@
           <a:p>
             <a:pPr lvl="1"/>
             <a:r>
-              <a:rPr lang="es-ES" dirty="0" err="1"/>
-              <a:t>Ubicáción</a:t>
-            </a:r>
-            <a:r>
-              <a:rPr lang="es-ES" dirty="0"/>
-              <a:t> (¿en qué nodo?)</a:t>
+              <a:rPr lang="es-ES" dirty="0"/>
+              <a:t>Ubicación (¿en qué nodo?)</a:t>
             </a:r>
           </a:p>
           <a:p>
@@ -15743,7 +15795,7 @@
         </p:nvGrpSpPr>
         <p:grpSpPr>
           <a:xfrm>
-            <a:off x="419542" y="1901790"/>
+            <a:off x="5383393" y="1901790"/>
             <a:ext cx="1867829" cy="1844574"/>
             <a:chOff x="889425" y="1810797"/>
             <a:chExt cx="1867829" cy="1844574"/>
@@ -15851,7 +15903,7 @@
         </p:nvGrpSpPr>
         <p:grpSpPr>
           <a:xfrm>
-            <a:off x="4790475" y="1901790"/>
+            <a:off x="57406" y="1901790"/>
             <a:ext cx="1700561" cy="1933847"/>
             <a:chOff x="5006898" y="2074127"/>
             <a:chExt cx="1700561" cy="1933847"/>
@@ -15971,7 +16023,7 @@
         </p:nvGrpSpPr>
         <p:grpSpPr>
           <a:xfrm>
-            <a:off x="2824665" y="1901790"/>
+            <a:off x="3942567" y="1901790"/>
             <a:ext cx="1364626" cy="1971344"/>
             <a:chOff x="3199763" y="2207247"/>
             <a:chExt cx="1364626" cy="1971344"/>
@@ -16080,7 +16132,7 @@
         </p:nvGrpSpPr>
         <p:grpSpPr>
           <a:xfrm>
-            <a:off x="6721654" y="1901790"/>
+            <a:off x="1933868" y="2117233"/>
             <a:ext cx="1936749" cy="1718404"/>
             <a:chOff x="7017162" y="1901790"/>
             <a:chExt cx="1936749" cy="1718404"/>
@@ -16169,6 +16221,93 @@
           </p:txBody>
         </p:sp>
       </p:grpSp>
+      <p:sp>
+        <p:nvSpPr>
+          <p:cNvPr id="16" name="TextBox 15">
+            <a:extLst>
+              <a:ext uri="{FF2B5EF4-FFF2-40B4-BE49-F238E27FC236}">
+                <a16:creationId xmlns:a16="http://schemas.microsoft.com/office/drawing/2014/main" id="{EE54243B-C21F-BB86-AAF5-AF813F30F878}"/>
+              </a:ext>
+            </a:extLst>
+          </p:cNvPr>
+          <p:cNvSpPr txBox="1"/>
+          <p:nvPr/>
+        </p:nvSpPr>
+        <p:spPr>
+          <a:xfrm>
+            <a:off x="7049928" y="3457635"/>
+            <a:ext cx="1867829" cy="307777"/>
+          </a:xfrm>
+          <a:prstGeom prst="rect">
+            <a:avLst/>
+          </a:prstGeom>
+          <a:noFill/>
+        </p:spPr>
+        <p:txBody>
+          <a:bodyPr wrap="square" rtlCol="0">
+            <a:spAutoFit/>
+          </a:bodyPr>
+          <a:lstStyle/>
+          <a:p>
+            <a:pPr algn="ctr"/>
+            <a:r>
+              <a:rPr lang="es-ES" dirty="0" err="1"/>
+              <a:t>Function</a:t>
+            </a:r>
+            <a:r>
+              <a:rPr lang="es-ES" dirty="0"/>
+              <a:t> App</a:t>
+            </a:r>
+          </a:p>
+        </p:txBody>
+      </p:sp>
+      <p:pic>
+        <p:nvPicPr>
+          <p:cNvPr id="1032" name="Picture 8" descr="Azure Functions: Overview and Common Use Cases - RevDeBug">
+            <a:extLst>
+              <a:ext uri="{FF2B5EF4-FFF2-40B4-BE49-F238E27FC236}">
+                <a16:creationId xmlns:a16="http://schemas.microsoft.com/office/drawing/2014/main" id="{FAE0F76C-5964-EB0F-820A-B4256BB4AA7B}"/>
+              </a:ext>
+            </a:extLst>
+          </p:cNvPr>
+          <p:cNvPicPr>
+            <a:picLocks noChangeAspect="1" noChangeArrowheads="1"/>
+          </p:cNvPicPr>
+          <p:nvPr/>
+        </p:nvPicPr>
+        <p:blipFill>
+          <a:blip r:embed="rId6">
+            <a:extLst>
+              <a:ext uri="{28A0092B-C50C-407E-A947-70E740481C1C}">
+                <a14:useLocalDpi xmlns:a14="http://schemas.microsoft.com/office/drawing/2010/main" val="0"/>
+              </a:ext>
+            </a:extLst>
+          </a:blip>
+          <a:srcRect/>
+          <a:stretch>
+            <a:fillRect/>
+          </a:stretch>
+        </p:blipFill>
+        <p:spPr bwMode="auto">
+          <a:xfrm>
+            <a:off x="7133563" y="2013374"/>
+            <a:ext cx="1700561" cy="1141458"/>
+          </a:xfrm>
+          <a:prstGeom prst="rect">
+            <a:avLst/>
+          </a:prstGeom>
+          <a:noFill/>
+          <a:extLst>
+            <a:ext uri="{909E8E84-426E-40DD-AFC4-6F175D3DCCD1}">
+              <a14:hiddenFill xmlns:a14="http://schemas.microsoft.com/office/drawing/2010/main">
+                <a:solidFill>
+                  <a:srgbClr val="FFFFFF"/>
+                </a:solidFill>
+              </a14:hiddenFill>
+            </a:ext>
+          </a:extLst>
+        </p:spPr>
+      </p:pic>
     </p:spTree>
     <p:extLst>
       <p:ext uri="{BB962C8B-B14F-4D97-AF65-F5344CB8AC3E}">
@@ -16525,6 +16664,141 @@
       </p:grpSpPr>
       <p:sp>
         <p:nvSpPr>
+          <p:cNvPr id="3" name="Text Placeholder 2">
+            <a:extLst>
+              <a:ext uri="{FF2B5EF4-FFF2-40B4-BE49-F238E27FC236}">
+                <a16:creationId xmlns:a16="http://schemas.microsoft.com/office/drawing/2014/main" id="{3099FEEE-0AF9-86E6-E0D9-2297C29DB461}"/>
+              </a:ext>
+            </a:extLst>
+          </p:cNvPr>
+          <p:cNvSpPr>
+            <a:spLocks noGrp="1"/>
+          </p:cNvSpPr>
+          <p:nvPr>
+            <p:ph type="body" sz="quarter" idx="10"/>
+          </p:nvPr>
+        </p:nvSpPr>
+        <p:spPr>
+          <a:xfrm>
+            <a:off x="1596802" y="1911745"/>
+            <a:ext cx="5360813" cy="1964767"/>
+          </a:xfrm>
+        </p:spPr>
+        <p:txBody>
+          <a:bodyPr/>
+          <a:lstStyle/>
+          <a:p>
+            <a:endParaRPr lang="es-ES" dirty="0"/>
+          </a:p>
+        </p:txBody>
+      </p:sp>
+      <p:pic>
+        <p:nvPicPr>
+          <p:cNvPr id="2050" name="Picture 2" descr="Example scenarios for Azure Container Apps.">
+            <a:extLst>
+              <a:ext uri="{FF2B5EF4-FFF2-40B4-BE49-F238E27FC236}">
+                <a16:creationId xmlns:a16="http://schemas.microsoft.com/office/drawing/2014/main" id="{39D1DB1E-6971-1ECD-CF31-E5EAA1EF4C67}"/>
+              </a:ext>
+            </a:extLst>
+          </p:cNvPr>
+          <p:cNvPicPr>
+            <a:picLocks noChangeAspect="1" noChangeArrowheads="1"/>
+          </p:cNvPicPr>
+          <p:nvPr/>
+        </p:nvPicPr>
+        <p:blipFill>
+          <a:blip r:embed="rId2">
+            <a:extLst>
+              <a:ext uri="{28A0092B-C50C-407E-A947-70E740481C1C}">
+                <a14:useLocalDpi xmlns:a14="http://schemas.microsoft.com/office/drawing/2010/main" val="0"/>
+              </a:ext>
+            </a:extLst>
+          </a:blip>
+          <a:srcRect/>
+          <a:stretch>
+            <a:fillRect/>
+          </a:stretch>
+        </p:blipFill>
+        <p:spPr bwMode="auto">
+          <a:xfrm>
+            <a:off x="1334158" y="1073882"/>
+            <a:ext cx="6475683" cy="3711518"/>
+          </a:xfrm>
+          <a:prstGeom prst="rect">
+            <a:avLst/>
+          </a:prstGeom>
+          <a:noFill/>
+          <a:extLst>
+            <a:ext uri="{909E8E84-426E-40DD-AFC4-6F175D3DCCD1}">
+              <a14:hiddenFill xmlns:a14="http://schemas.microsoft.com/office/drawing/2010/main">
+                <a:solidFill>
+                  <a:srgbClr val="FFFFFF"/>
+                </a:solidFill>
+              </a14:hiddenFill>
+            </a:ext>
+          </a:extLst>
+        </p:spPr>
+      </p:pic>
+      <p:sp>
+        <p:nvSpPr>
+          <p:cNvPr id="2" name="Title 1">
+            <a:extLst>
+              <a:ext uri="{FF2B5EF4-FFF2-40B4-BE49-F238E27FC236}">
+                <a16:creationId xmlns:a16="http://schemas.microsoft.com/office/drawing/2014/main" id="{7D27639E-8145-C0F4-C24E-DE24F23B86E5}"/>
+              </a:ext>
+            </a:extLst>
+          </p:cNvPr>
+          <p:cNvSpPr>
+            <a:spLocks noGrp="1"/>
+          </p:cNvSpPr>
+          <p:nvPr>
+            <p:ph type="title"/>
+          </p:nvPr>
+        </p:nvSpPr>
+        <p:spPr/>
+        <p:txBody>
+          <a:bodyPr/>
+          <a:lstStyle/>
+          <a:p>
+            <a:r>
+              <a:rPr lang="es-ES" dirty="0"/>
+              <a:t>¿Qué es Container Apps?</a:t>
+            </a:r>
+          </a:p>
+        </p:txBody>
+      </p:sp>
+    </p:spTree>
+    <p:extLst>
+      <p:ext uri="{BB962C8B-B14F-4D97-AF65-F5344CB8AC3E}">
+        <p14:creationId xmlns:p14="http://schemas.microsoft.com/office/powerpoint/2010/main" val="3074527727"/>
+      </p:ext>
+    </p:extLst>
+  </p:cSld>
+  <p:clrMapOvr>
+    <a:masterClrMapping/>
+  </p:clrMapOvr>
+</p:sld>
+</file>
+
+<file path=ppt/slides/slide36.xml><?xml version="1.0" encoding="utf-8"?>
+<p:sld xmlns:a="http://schemas.openxmlformats.org/drawingml/2006/main" xmlns:r="http://schemas.openxmlformats.org/officeDocument/2006/relationships" xmlns:p="http://schemas.openxmlformats.org/presentationml/2006/main">
+  <p:cSld>
+    <p:spTree>
+      <p:nvGrpSpPr>
+        <p:cNvPr id="1" name=""/>
+        <p:cNvGrpSpPr/>
+        <p:nvPr/>
+      </p:nvGrpSpPr>
+      <p:grpSpPr>
+        <a:xfrm>
+          <a:off x="0" y="0"/>
+          <a:ext cx="0" cy="0"/>
+          <a:chOff x="0" y="0"/>
+          <a:chExt cx="0" cy="0"/>
+        </a:xfrm>
+      </p:grpSpPr>
+      <p:sp>
+        <p:nvSpPr>
           <p:cNvPr id="3" name="Title 2">
             <a:extLst>
               <a:ext uri="{FF2B5EF4-FFF2-40B4-BE49-F238E27FC236}">
@@ -16579,7 +16853,9 @@
           </a:xfrm>
         </p:spPr>
         <p:txBody>
-          <a:bodyPr/>
+          <a:bodyPr>
+            <a:normAutofit fontScale="92500" lnSpcReduction="20000"/>
+          </a:bodyPr>
           <a:lstStyle/>
           <a:p>
             <a:r>
@@ -16611,6 +16887,17 @@
               <a:rPr lang="es-ES" dirty="0"/>
               <a:t>Misma red virtual</a:t>
             </a:r>
+          </a:p>
+          <a:p>
+            <a:r>
+              <a:rPr lang="es-ES" dirty="0"/>
+              <a:t>Subred dedicada exclusivamente al </a:t>
+            </a:r>
+            <a:r>
+              <a:rPr lang="es-ES" dirty="0" err="1"/>
+              <a:t>environment</a:t>
+            </a:r>
+            <a:endParaRPr lang="es-ES" dirty="0"/>
           </a:p>
         </p:txBody>
       </p:sp>
@@ -16629,7 +16916,7 @@
         <p:spPr>
           <a:xfrm>
             <a:off x="1847821" y="2908889"/>
-            <a:ext cx="5448358" cy="1600438"/>
+            <a:ext cx="5448358" cy="2893100"/>
           </a:xfrm>
           <a:prstGeom prst="rect">
             <a:avLst/>
@@ -16652,6 +16939,129 @@
               <a:rPr lang="en-US" dirty="0">
                 <a:latin typeface="Consolas" panose="020B0609020204030204" pitchFamily="49" charset="0"/>
               </a:rPr>
+              <a:t> network </a:t>
+            </a:r>
+            <a:r>
+              <a:rPr lang="en-US" dirty="0" err="1">
+                <a:latin typeface="Consolas" panose="020B0609020204030204" pitchFamily="49" charset="0"/>
+              </a:rPr>
+              <a:t>vnet</a:t>
+            </a:r>
+            <a:r>
+              <a:rPr lang="en-US" dirty="0">
+                <a:latin typeface="Consolas" panose="020B0609020204030204" pitchFamily="49" charset="0"/>
+              </a:rPr>
+              <a:t> subnet update \</a:t>
+            </a:r>
+          </a:p>
+          <a:p>
+            <a:r>
+              <a:rPr lang="en-US" dirty="0">
+                <a:latin typeface="Consolas" panose="020B0609020204030204" pitchFamily="49" charset="0"/>
+              </a:rPr>
+              <a:t>  --resource-group </a:t>
+            </a:r>
+            <a:r>
+              <a:rPr lang="en-US" dirty="0" err="1">
+                <a:latin typeface="Consolas" panose="020B0609020204030204" pitchFamily="49" charset="0"/>
+              </a:rPr>
+              <a:t>devops-ulpgc</a:t>
+            </a:r>
+            <a:r>
+              <a:rPr lang="en-US" dirty="0">
+                <a:latin typeface="Consolas" panose="020B0609020204030204" pitchFamily="49" charset="0"/>
+              </a:rPr>
+              <a:t> \</a:t>
+            </a:r>
+          </a:p>
+          <a:p>
+            <a:r>
+              <a:rPr lang="en-US" dirty="0">
+                <a:latin typeface="Consolas" panose="020B0609020204030204" pitchFamily="49" charset="0"/>
+              </a:rPr>
+              <a:t>  --name </a:t>
+            </a:r>
+            <a:r>
+              <a:rPr lang="en-US" dirty="0" err="1">
+                <a:latin typeface="Consolas" panose="020B0609020204030204" pitchFamily="49" charset="0"/>
+              </a:rPr>
+              <a:t>containerapps</a:t>
+            </a:r>
+            <a:r>
+              <a:rPr lang="en-US" dirty="0">
+                <a:latin typeface="Consolas" panose="020B0609020204030204" pitchFamily="49" charset="0"/>
+              </a:rPr>
+              <a:t>-subnet \</a:t>
+            </a:r>
+          </a:p>
+          <a:p>
+            <a:r>
+              <a:rPr lang="en-US" dirty="0">
+                <a:latin typeface="Consolas" panose="020B0609020204030204" pitchFamily="49" charset="0"/>
+              </a:rPr>
+              <a:t>  --</a:t>
+            </a:r>
+            <a:r>
+              <a:rPr lang="en-US" dirty="0" err="1">
+                <a:latin typeface="Consolas" panose="020B0609020204030204" pitchFamily="49" charset="0"/>
+              </a:rPr>
+              <a:t>vnet</a:t>
+            </a:r>
+            <a:r>
+              <a:rPr lang="en-US" dirty="0">
+                <a:latin typeface="Consolas" panose="020B0609020204030204" pitchFamily="49" charset="0"/>
+              </a:rPr>
+              <a:t>-name </a:t>
+            </a:r>
+            <a:r>
+              <a:rPr lang="en-US" dirty="0" err="1">
+                <a:latin typeface="Consolas" panose="020B0609020204030204" pitchFamily="49" charset="0"/>
+              </a:rPr>
+              <a:t>containerapps-vnet</a:t>
+            </a:r>
+            <a:r>
+              <a:rPr lang="en-US" dirty="0">
+                <a:latin typeface="Consolas" panose="020B0609020204030204" pitchFamily="49" charset="0"/>
+              </a:rPr>
+              <a:t> \</a:t>
+            </a:r>
+          </a:p>
+          <a:p>
+            <a:r>
+              <a:rPr lang="en-US" dirty="0">
+                <a:latin typeface="Consolas" panose="020B0609020204030204" pitchFamily="49" charset="0"/>
+              </a:rPr>
+              <a:t>  --delegations </a:t>
+            </a:r>
+            <a:r>
+              <a:rPr lang="en-US" dirty="0" err="1">
+                <a:latin typeface="Consolas" panose="020B0609020204030204" pitchFamily="49" charset="0"/>
+              </a:rPr>
+              <a:t>Microsoft.App</a:t>
+            </a:r>
+            <a:r>
+              <a:rPr lang="en-US" dirty="0">
+                <a:latin typeface="Consolas" panose="020B0609020204030204" pitchFamily="49" charset="0"/>
+              </a:rPr>
+              <a:t>/environments</a:t>
+            </a:r>
+          </a:p>
+          <a:p>
+            <a:endParaRPr lang="en-US" dirty="0">
+              <a:latin typeface="Consolas" panose="020B0609020204030204" pitchFamily="49" charset="0"/>
+            </a:endParaRPr>
+          </a:p>
+          <a:p>
+            <a:r>
+              <a:rPr lang="en-US" dirty="0" err="1">
+                <a:latin typeface="Consolas" panose="020B0609020204030204" pitchFamily="49" charset="0"/>
+              </a:rPr>
+              <a:t>az</a:t>
+            </a:r>
+            <a:r>
+              <a:rPr lang="en-US" dirty="0">
+                <a:latin typeface="Consolas" panose="020B0609020204030204" pitchFamily="49" charset="0"/>
+              </a:rPr>
               <a:t> </a:t>
             </a:r>
             <a:r>
@@ -16718,7 +17128,7 @@
               <a:rPr lang="en-US" dirty="0" err="1">
                 <a:latin typeface="Consolas" panose="020B0609020204030204" pitchFamily="49" charset="0"/>
               </a:rPr>
-              <a:t>westeurope</a:t>
+              <a:t>northeurope</a:t>
             </a:r>
             <a:r>
               <a:rPr lang="en-US" dirty="0">
@@ -16781,7 +17191,476 @@
 </p:sld>
 </file>
 
-<file path=ppt/slides/slide36.xml><?xml version="1.0" encoding="utf-8"?>
+<file path=ppt/slides/slide37.xml><?xml version="1.0" encoding="utf-8"?>
+<p:sld xmlns:a="http://schemas.openxmlformats.org/drawingml/2006/main" xmlns:r="http://schemas.openxmlformats.org/officeDocument/2006/relationships" xmlns:p="http://schemas.openxmlformats.org/presentationml/2006/main">
+  <p:cSld>
+    <p:spTree>
+      <p:nvGrpSpPr>
+        <p:cNvPr id="1" name="">
+          <a:extLst>
+            <a:ext uri="{FF2B5EF4-FFF2-40B4-BE49-F238E27FC236}">
+              <a16:creationId xmlns:a16="http://schemas.microsoft.com/office/drawing/2014/main" id="{8A2D56E4-D6C2-6793-F6C3-4E4704C65E27}"/>
+            </a:ext>
+          </a:extLst>
+        </p:cNvPr>
+        <p:cNvGrpSpPr/>
+        <p:nvPr/>
+      </p:nvGrpSpPr>
+      <p:grpSpPr>
+        <a:xfrm>
+          <a:off x="0" y="0"/>
+          <a:ext cx="0" cy="0"/>
+          <a:chOff x="0" y="0"/>
+          <a:chExt cx="0" cy="0"/>
+        </a:xfrm>
+      </p:grpSpPr>
+      <p:sp>
+        <p:nvSpPr>
+          <p:cNvPr id="3" name="Title 2">
+            <a:extLst>
+              <a:ext uri="{FF2B5EF4-FFF2-40B4-BE49-F238E27FC236}">
+                <a16:creationId xmlns:a16="http://schemas.microsoft.com/office/drawing/2014/main" id="{165239E6-9088-7F3F-1C9F-799D991DAAC9}"/>
+              </a:ext>
+            </a:extLst>
+          </p:cNvPr>
+          <p:cNvSpPr>
+            <a:spLocks noGrp="1"/>
+          </p:cNvSpPr>
+          <p:nvPr>
+            <p:ph type="title"/>
+          </p:nvPr>
+        </p:nvSpPr>
+        <p:spPr/>
+        <p:txBody>
+          <a:bodyPr/>
+          <a:lstStyle/>
+          <a:p>
+            <a:r>
+              <a:rPr lang="es-ES" dirty="0"/>
+              <a:t>Container Apps </a:t>
+            </a:r>
+            <a:r>
+              <a:rPr lang="es-ES" dirty="0" err="1"/>
+              <a:t>Environment</a:t>
+            </a:r>
+            <a:endParaRPr lang="es-ES" dirty="0"/>
+          </a:p>
+        </p:txBody>
+      </p:sp>
+      <p:sp>
+        <p:nvSpPr>
+          <p:cNvPr id="5" name="TextBox 4">
+            <a:extLst>
+              <a:ext uri="{FF2B5EF4-FFF2-40B4-BE49-F238E27FC236}">
+                <a16:creationId xmlns:a16="http://schemas.microsoft.com/office/drawing/2014/main" id="{A7DB8428-4C64-6497-62BB-E7B634276C7B}"/>
+              </a:ext>
+            </a:extLst>
+          </p:cNvPr>
+          <p:cNvSpPr txBox="1"/>
+          <p:nvPr/>
+        </p:nvSpPr>
+        <p:spPr>
+          <a:xfrm>
+            <a:off x="1847821" y="957739"/>
+            <a:ext cx="5448358" cy="4185761"/>
+          </a:xfrm>
+          <a:prstGeom prst="rect">
+            <a:avLst/>
+          </a:prstGeom>
+          <a:noFill/>
+        </p:spPr>
+        <p:txBody>
+          <a:bodyPr wrap="square" rtlCol="0">
+            <a:spAutoFit/>
+          </a:bodyPr>
+          <a:lstStyle/>
+          <a:p>
+            <a:r>
+              <a:rPr lang="en-US" dirty="0" err="1">
+                <a:latin typeface="Consolas" panose="020B0609020204030204" pitchFamily="49" charset="0"/>
+              </a:rPr>
+              <a:t>az</a:t>
+            </a:r>
+            <a:r>
+              <a:rPr lang="en-US" dirty="0">
+                <a:latin typeface="Consolas" panose="020B0609020204030204" pitchFamily="49" charset="0"/>
+              </a:rPr>
+              <a:t> network </a:t>
+            </a:r>
+            <a:r>
+              <a:rPr lang="en-US" dirty="0" err="1">
+                <a:latin typeface="Consolas" panose="020B0609020204030204" pitchFamily="49" charset="0"/>
+              </a:rPr>
+              <a:t>vnet</a:t>
+            </a:r>
+            <a:r>
+              <a:rPr lang="en-US" dirty="0">
+                <a:latin typeface="Consolas" panose="020B0609020204030204" pitchFamily="49" charset="0"/>
+              </a:rPr>
+              <a:t> subnet update \</a:t>
+            </a:r>
+          </a:p>
+          <a:p>
+            <a:r>
+              <a:rPr lang="en-US" dirty="0">
+                <a:latin typeface="Consolas" panose="020B0609020204030204" pitchFamily="49" charset="0"/>
+              </a:rPr>
+              <a:t>  --resource-group </a:t>
+            </a:r>
+            <a:r>
+              <a:rPr lang="en-US" dirty="0" err="1">
+                <a:latin typeface="Consolas" panose="020B0609020204030204" pitchFamily="49" charset="0"/>
+              </a:rPr>
+              <a:t>devops-ulpgc</a:t>
+            </a:r>
+            <a:r>
+              <a:rPr lang="en-US" dirty="0">
+                <a:latin typeface="Consolas" panose="020B0609020204030204" pitchFamily="49" charset="0"/>
+              </a:rPr>
+              <a:t> \</a:t>
+            </a:r>
+          </a:p>
+          <a:p>
+            <a:r>
+              <a:rPr lang="en-US" dirty="0">
+                <a:latin typeface="Consolas" panose="020B0609020204030204" pitchFamily="49" charset="0"/>
+              </a:rPr>
+              <a:t>  --name </a:t>
+            </a:r>
+            <a:r>
+              <a:rPr lang="en-US" dirty="0" err="1">
+                <a:latin typeface="Consolas" panose="020B0609020204030204" pitchFamily="49" charset="0"/>
+              </a:rPr>
+              <a:t>containerapps</a:t>
+            </a:r>
+            <a:r>
+              <a:rPr lang="en-US" dirty="0">
+                <a:latin typeface="Consolas" panose="020B0609020204030204" pitchFamily="49" charset="0"/>
+              </a:rPr>
+              <a:t>-subnet \</a:t>
+            </a:r>
+          </a:p>
+          <a:p>
+            <a:r>
+              <a:rPr lang="en-US" dirty="0">
+                <a:latin typeface="Consolas" panose="020B0609020204030204" pitchFamily="49" charset="0"/>
+              </a:rPr>
+              <a:t>  --</a:t>
+            </a:r>
+            <a:r>
+              <a:rPr lang="en-US" dirty="0" err="1">
+                <a:latin typeface="Consolas" panose="020B0609020204030204" pitchFamily="49" charset="0"/>
+              </a:rPr>
+              <a:t>vnet</a:t>
+            </a:r>
+            <a:r>
+              <a:rPr lang="en-US" dirty="0">
+                <a:latin typeface="Consolas" panose="020B0609020204030204" pitchFamily="49" charset="0"/>
+              </a:rPr>
+              <a:t>-name </a:t>
+            </a:r>
+            <a:r>
+              <a:rPr lang="en-US" dirty="0" err="1">
+                <a:latin typeface="Consolas" panose="020B0609020204030204" pitchFamily="49" charset="0"/>
+              </a:rPr>
+              <a:t>containerapps-vnet</a:t>
+            </a:r>
+            <a:r>
+              <a:rPr lang="en-US" dirty="0">
+                <a:latin typeface="Consolas" panose="020B0609020204030204" pitchFamily="49" charset="0"/>
+              </a:rPr>
+              <a:t> \</a:t>
+            </a:r>
+          </a:p>
+          <a:p>
+            <a:r>
+              <a:rPr lang="en-US" dirty="0">
+                <a:latin typeface="Consolas" panose="020B0609020204030204" pitchFamily="49" charset="0"/>
+              </a:rPr>
+              <a:t>  --delegations </a:t>
+            </a:r>
+            <a:r>
+              <a:rPr lang="en-US" dirty="0" err="1">
+                <a:latin typeface="Consolas" panose="020B0609020204030204" pitchFamily="49" charset="0"/>
+              </a:rPr>
+              <a:t>Microsoft.App</a:t>
+            </a:r>
+            <a:r>
+              <a:rPr lang="en-US" dirty="0">
+                <a:latin typeface="Consolas" panose="020B0609020204030204" pitchFamily="49" charset="0"/>
+              </a:rPr>
+              <a:t>/environments</a:t>
+            </a:r>
+          </a:p>
+          <a:p>
+            <a:endParaRPr lang="en-US" dirty="0">
+              <a:latin typeface="Consolas" panose="020B0609020204030204" pitchFamily="49" charset="0"/>
+            </a:endParaRPr>
+          </a:p>
+          <a:p>
+            <a:r>
+              <a:rPr lang="en-US" dirty="0" err="1">
+                <a:latin typeface="Consolas" panose="020B0609020204030204" pitchFamily="49" charset="0"/>
+              </a:rPr>
+              <a:t>az</a:t>
+            </a:r>
+            <a:r>
+              <a:rPr lang="en-US" dirty="0">
+                <a:latin typeface="Consolas" panose="020B0609020204030204" pitchFamily="49" charset="0"/>
+              </a:rPr>
+              <a:t> network </a:t>
+            </a:r>
+            <a:r>
+              <a:rPr lang="en-US" dirty="0" err="1">
+                <a:latin typeface="Consolas" panose="020B0609020204030204" pitchFamily="49" charset="0"/>
+              </a:rPr>
+              <a:t>vnet</a:t>
+            </a:r>
+            <a:r>
+              <a:rPr lang="en-US" dirty="0">
+                <a:latin typeface="Consolas" panose="020B0609020204030204" pitchFamily="49" charset="0"/>
+              </a:rPr>
+              <a:t> subnet show \</a:t>
+            </a:r>
+          </a:p>
+          <a:p>
+            <a:r>
+              <a:rPr lang="en-US" dirty="0">
+                <a:latin typeface="Consolas" panose="020B0609020204030204" pitchFamily="49" charset="0"/>
+              </a:rPr>
+              <a:t>  --</a:t>
+            </a:r>
+            <a:r>
+              <a:rPr lang="en-US" dirty="0" err="1">
+                <a:latin typeface="Consolas" panose="020B0609020204030204" pitchFamily="49" charset="0"/>
+              </a:rPr>
+              <a:t>nname</a:t>
+            </a:r>
+            <a:r>
+              <a:rPr lang="en-US" dirty="0">
+                <a:latin typeface="Consolas" panose="020B0609020204030204" pitchFamily="49" charset="0"/>
+              </a:rPr>
+              <a:t> </a:t>
+            </a:r>
+            <a:r>
+              <a:rPr lang="en-US" dirty="0" err="1">
+                <a:latin typeface="Consolas" panose="020B0609020204030204" pitchFamily="49" charset="0"/>
+              </a:rPr>
+              <a:t>containerapps</a:t>
+            </a:r>
+            <a:r>
+              <a:rPr lang="en-US" dirty="0">
+                <a:latin typeface="Consolas" panose="020B0609020204030204" pitchFamily="49" charset="0"/>
+              </a:rPr>
+              <a:t>-subnet \</a:t>
+            </a:r>
+          </a:p>
+          <a:p>
+            <a:r>
+              <a:rPr lang="en-US" dirty="0">
+                <a:latin typeface="Consolas" panose="020B0609020204030204" pitchFamily="49" charset="0"/>
+              </a:rPr>
+              <a:t>  --resource-group </a:t>
+            </a:r>
+            <a:r>
+              <a:rPr lang="en-US" dirty="0" err="1">
+                <a:latin typeface="Consolas" panose="020B0609020204030204" pitchFamily="49" charset="0"/>
+              </a:rPr>
+              <a:t>devops-ulpgc</a:t>
+            </a:r>
+            <a:r>
+              <a:rPr lang="en-US" dirty="0">
+                <a:latin typeface="Consolas" panose="020B0609020204030204" pitchFamily="49" charset="0"/>
+              </a:rPr>
+              <a:t> \</a:t>
+            </a:r>
+          </a:p>
+          <a:p>
+            <a:r>
+              <a:rPr lang="en-US" dirty="0">
+                <a:latin typeface="Consolas" panose="020B0609020204030204" pitchFamily="49" charset="0"/>
+              </a:rPr>
+              <a:t>  --</a:t>
+            </a:r>
+            <a:r>
+              <a:rPr lang="en-US" dirty="0" err="1">
+                <a:latin typeface="Consolas" panose="020B0609020204030204" pitchFamily="49" charset="0"/>
+              </a:rPr>
+              <a:t>vnet</a:t>
+            </a:r>
+            <a:r>
+              <a:rPr lang="en-US" dirty="0">
+                <a:latin typeface="Consolas" panose="020B0609020204030204" pitchFamily="49" charset="0"/>
+              </a:rPr>
+              <a:t>-name </a:t>
+            </a:r>
+            <a:r>
+              <a:rPr lang="en-US" dirty="0" err="1">
+                <a:latin typeface="Consolas" panose="020B0609020204030204" pitchFamily="49" charset="0"/>
+              </a:rPr>
+              <a:t>containerapps-vnet</a:t>
+            </a:r>
+            <a:r>
+              <a:rPr lang="en-US" dirty="0">
+                <a:latin typeface="Consolas" panose="020B0609020204030204" pitchFamily="49" charset="0"/>
+              </a:rPr>
+              <a:t> \</a:t>
+            </a:r>
+          </a:p>
+          <a:p>
+            <a:r>
+              <a:rPr lang="en-US" dirty="0">
+                <a:latin typeface="Consolas" panose="020B0609020204030204" pitchFamily="49" charset="0"/>
+              </a:rPr>
+              <a:t>  --query id</a:t>
+            </a:r>
+          </a:p>
+          <a:p>
+            <a:endParaRPr lang="en-US" dirty="0">
+              <a:latin typeface="Consolas" panose="020B0609020204030204" pitchFamily="49" charset="0"/>
+            </a:endParaRPr>
+          </a:p>
+          <a:p>
+            <a:r>
+              <a:rPr lang="en-US" dirty="0" err="1">
+                <a:latin typeface="Consolas" panose="020B0609020204030204" pitchFamily="49" charset="0"/>
+              </a:rPr>
+              <a:t>az</a:t>
+            </a:r>
+            <a:r>
+              <a:rPr lang="en-US" dirty="0">
+                <a:latin typeface="Consolas" panose="020B0609020204030204" pitchFamily="49" charset="0"/>
+              </a:rPr>
+              <a:t> </a:t>
+            </a:r>
+            <a:r>
+              <a:rPr lang="en-US" dirty="0" err="1">
+                <a:latin typeface="Consolas" panose="020B0609020204030204" pitchFamily="49" charset="0"/>
+              </a:rPr>
+              <a:t>containerapp</a:t>
+            </a:r>
+            <a:r>
+              <a:rPr lang="en-US" dirty="0">
+                <a:latin typeface="Consolas" panose="020B0609020204030204" pitchFamily="49" charset="0"/>
+              </a:rPr>
+              <a:t> env create \</a:t>
+            </a:r>
+          </a:p>
+          <a:p>
+            <a:r>
+              <a:rPr lang="en-US" dirty="0">
+                <a:latin typeface="Consolas" panose="020B0609020204030204" pitchFamily="49" charset="0"/>
+              </a:rPr>
+              <a:t>  --name </a:t>
+            </a:r>
+            <a:r>
+              <a:rPr lang="en-US" dirty="0" err="1">
+                <a:latin typeface="Consolas" panose="020B0609020204030204" pitchFamily="49" charset="0"/>
+              </a:rPr>
+              <a:t>devops-containerapps</a:t>
+            </a:r>
+            <a:r>
+              <a:rPr lang="en-US" dirty="0">
+                <a:latin typeface="Consolas" panose="020B0609020204030204" pitchFamily="49" charset="0"/>
+              </a:rPr>
+              <a:t> \</a:t>
+            </a:r>
+          </a:p>
+          <a:p>
+            <a:r>
+              <a:rPr lang="en-US" dirty="0">
+                <a:latin typeface="Consolas" panose="020B0609020204030204" pitchFamily="49" charset="0"/>
+              </a:rPr>
+              <a:t>  --resource-group </a:t>
+            </a:r>
+            <a:r>
+              <a:rPr lang="en-US" dirty="0" err="1">
+                <a:latin typeface="Consolas" panose="020B0609020204030204" pitchFamily="49" charset="0"/>
+              </a:rPr>
+              <a:t>devops-ulpgc</a:t>
+            </a:r>
+            <a:r>
+              <a:rPr lang="en-US" dirty="0">
+                <a:latin typeface="Consolas" panose="020B0609020204030204" pitchFamily="49" charset="0"/>
+              </a:rPr>
+              <a:t> \</a:t>
+            </a:r>
+          </a:p>
+          <a:p>
+            <a:r>
+              <a:rPr lang="en-US" dirty="0">
+                <a:latin typeface="Consolas" panose="020B0609020204030204" pitchFamily="49" charset="0"/>
+              </a:rPr>
+              <a:t>  --location </a:t>
+            </a:r>
+            <a:r>
+              <a:rPr lang="en-US" dirty="0" err="1">
+                <a:latin typeface="Consolas" panose="020B0609020204030204" pitchFamily="49" charset="0"/>
+              </a:rPr>
+              <a:t>northeurope</a:t>
+            </a:r>
+            <a:r>
+              <a:rPr lang="en-US" dirty="0">
+                <a:latin typeface="Consolas" panose="020B0609020204030204" pitchFamily="49" charset="0"/>
+              </a:rPr>
+              <a:t> \</a:t>
+            </a:r>
+          </a:p>
+          <a:p>
+            <a:r>
+              <a:rPr lang="en-US" dirty="0">
+                <a:latin typeface="Consolas" panose="020B0609020204030204" pitchFamily="49" charset="0"/>
+              </a:rPr>
+              <a:t>  --infrastructure-subnet-resource-id &lt;subnet-id&gt;</a:t>
+            </a:r>
+          </a:p>
+          <a:p>
+            <a:endParaRPr lang="en-US" dirty="0">
+              <a:latin typeface="Consolas" panose="020B0609020204030204" pitchFamily="49" charset="0"/>
+            </a:endParaRPr>
+          </a:p>
+          <a:p>
+            <a:r>
+              <a:rPr lang="en-US" dirty="0" err="1">
+                <a:latin typeface="Consolas" panose="020B0609020204030204" pitchFamily="49" charset="0"/>
+              </a:rPr>
+              <a:t>az</a:t>
+            </a:r>
+            <a:r>
+              <a:rPr lang="en-US" dirty="0">
+                <a:latin typeface="Consolas" panose="020B0609020204030204" pitchFamily="49" charset="0"/>
+              </a:rPr>
+              <a:t> </a:t>
+            </a:r>
+            <a:r>
+              <a:rPr lang="en-US" dirty="0" err="1">
+                <a:latin typeface="Consolas" panose="020B0609020204030204" pitchFamily="49" charset="0"/>
+              </a:rPr>
+              <a:t>containerapp</a:t>
+            </a:r>
+            <a:r>
+              <a:rPr lang="en-US" dirty="0">
+                <a:latin typeface="Consolas" panose="020B0609020204030204" pitchFamily="49" charset="0"/>
+              </a:rPr>
+              <a:t> env list</a:t>
+            </a:r>
+          </a:p>
+        </p:txBody>
+      </p:sp>
+    </p:spTree>
+    <p:extLst>
+      <p:ext uri="{BB962C8B-B14F-4D97-AF65-F5344CB8AC3E}">
+        <p14:creationId xmlns:p14="http://schemas.microsoft.com/office/powerpoint/2010/main" val="3237447587"/>
+      </p:ext>
+    </p:extLst>
+  </p:cSld>
+  <p:clrMapOvr>
+    <a:masterClrMapping/>
+  </p:clrMapOvr>
+</p:sld>
+</file>
+
+<file path=ppt/slides/slide38.xml><?xml version="1.0" encoding="utf-8"?>
 <p:sld xmlns:a="http://schemas.openxmlformats.org/drawingml/2006/main" xmlns:r="http://schemas.openxmlformats.org/officeDocument/2006/relationships" xmlns:p="http://schemas.openxmlformats.org/presentationml/2006/main">
   <p:cSld>
     <p:spTree>
@@ -16891,7 +17770,7 @@
 </p:sld>
 </file>
 
-<file path=ppt/slides/slide37.xml><?xml version="1.0" encoding="utf-8"?>
+<file path=ppt/slides/slide39.xml><?xml version="1.0" encoding="utf-8"?>
 <p:sld xmlns:a="http://schemas.openxmlformats.org/drawingml/2006/main" xmlns:r="http://schemas.openxmlformats.org/officeDocument/2006/relationships" xmlns:p="http://schemas.openxmlformats.org/presentationml/2006/main">
   <p:cSld>
     <p:spTree>
@@ -17012,7 +17891,129 @@
 </p:sld>
 </file>
 
-<file path=ppt/slides/slide38.xml><?xml version="1.0" encoding="utf-8"?>
+<file path=ppt/slides/slide4.xml><?xml version="1.0" encoding="utf-8"?>
+<p:sld xmlns:a="http://schemas.openxmlformats.org/drawingml/2006/main" xmlns:r="http://schemas.openxmlformats.org/officeDocument/2006/relationships" xmlns:p="http://schemas.openxmlformats.org/presentationml/2006/main">
+  <p:cSld>
+    <p:spTree>
+      <p:nvGrpSpPr>
+        <p:cNvPr id="1" name=""/>
+        <p:cNvGrpSpPr/>
+        <p:nvPr/>
+      </p:nvGrpSpPr>
+      <p:grpSpPr>
+        <a:xfrm>
+          <a:off x="0" y="0"/>
+          <a:ext cx="0" cy="0"/>
+          <a:chOff x="0" y="0"/>
+          <a:chExt cx="0" cy="0"/>
+        </a:xfrm>
+      </p:grpSpPr>
+      <p:sp>
+        <p:nvSpPr>
+          <p:cNvPr id="2" name="Title 1">
+            <a:extLst>
+              <a:ext uri="{FF2B5EF4-FFF2-40B4-BE49-F238E27FC236}">
+                <a16:creationId xmlns:a16="http://schemas.microsoft.com/office/drawing/2014/main" id="{32D4F2CF-2B7A-B451-CD50-C627D75B618E}"/>
+              </a:ext>
+            </a:extLst>
+          </p:cNvPr>
+          <p:cNvSpPr>
+            <a:spLocks noGrp="1"/>
+          </p:cNvSpPr>
+          <p:nvPr>
+            <p:ph type="title"/>
+          </p:nvPr>
+        </p:nvSpPr>
+        <p:spPr/>
+        <p:txBody>
+          <a:bodyPr/>
+          <a:lstStyle/>
+          <a:p>
+            <a:r>
+              <a:rPr lang="es-ES" dirty="0"/>
+              <a:t>Características de </a:t>
+            </a:r>
+            <a:r>
+              <a:rPr lang="es-ES" dirty="0" err="1"/>
+              <a:t>cloud</a:t>
+            </a:r>
+            <a:r>
+              <a:rPr lang="es-ES" dirty="0"/>
+              <a:t> </a:t>
+            </a:r>
+            <a:r>
+              <a:rPr lang="es-ES" dirty="0" err="1"/>
+              <a:t>computing</a:t>
+            </a:r>
+            <a:endParaRPr lang="es-ES" dirty="0"/>
+          </a:p>
+        </p:txBody>
+      </p:sp>
+      <p:sp>
+        <p:nvSpPr>
+          <p:cNvPr id="3" name="Text Placeholder 2">
+            <a:extLst>
+              <a:ext uri="{FF2B5EF4-FFF2-40B4-BE49-F238E27FC236}">
+                <a16:creationId xmlns:a16="http://schemas.microsoft.com/office/drawing/2014/main" id="{1A333CAF-2264-57C8-C38C-F56D4266DA45}"/>
+              </a:ext>
+            </a:extLst>
+          </p:cNvPr>
+          <p:cNvSpPr>
+            <a:spLocks noGrp="1"/>
+          </p:cNvSpPr>
+          <p:nvPr>
+            <p:ph type="body" sz="quarter" idx="10"/>
+          </p:nvPr>
+        </p:nvSpPr>
+        <p:spPr/>
+        <p:txBody>
+          <a:bodyPr>
+            <a:normAutofit/>
+          </a:bodyPr>
+          <a:lstStyle/>
+          <a:p>
+            <a:r>
+              <a:rPr lang="en-US" dirty="0"/>
+              <a:t>Measured Service</a:t>
+            </a:r>
+          </a:p>
+          <a:p>
+            <a:pPr lvl="1"/>
+            <a:r>
+              <a:rPr lang="es-ES" dirty="0"/>
+              <a:t>El pago se realiza solo por los recursos realmente utilizados</a:t>
+            </a:r>
+          </a:p>
+          <a:p>
+            <a:pPr lvl="1"/>
+            <a:r>
+              <a:rPr lang="es-ES" dirty="0"/>
+              <a:t>La medición generalmente se realiza en alta resolución.</a:t>
+            </a:r>
+          </a:p>
+          <a:p>
+            <a:pPr lvl="1"/>
+            <a:r>
+              <a:rPr lang="es-ES" dirty="0"/>
+              <a:t>No es necesario invertir dinero en recursos no utilizados</a:t>
+            </a:r>
+          </a:p>
+        </p:txBody>
+      </p:sp>
+    </p:spTree>
+    <p:extLst>
+      <p:ext uri="{BB962C8B-B14F-4D97-AF65-F5344CB8AC3E}">
+        <p14:creationId xmlns:p14="http://schemas.microsoft.com/office/powerpoint/2010/main" val="2035947615"/>
+      </p:ext>
+    </p:extLst>
+  </p:cSld>
+  <p:clrMapOvr>
+    <a:masterClrMapping/>
+  </p:clrMapOvr>
+</p:sld>
+</file>
+
+<file path=ppt/slides/slide40.xml><?xml version="1.0" encoding="utf-8"?>
 <p:sld xmlns:a="http://schemas.openxmlformats.org/drawingml/2006/main" xmlns:r="http://schemas.openxmlformats.org/officeDocument/2006/relationships" xmlns:p="http://schemas.openxmlformats.org/presentationml/2006/main">
   <p:cSld>
     <p:spTree>
@@ -17129,8 +18130,8 @@
         </p:nvSpPr>
         <p:spPr>
           <a:xfrm>
-            <a:off x="1847820" y="2908889"/>
-            <a:ext cx="6381779" cy="2031325"/>
+            <a:off x="1254798" y="2908889"/>
+            <a:ext cx="6974802" cy="2031325"/>
           </a:xfrm>
           <a:prstGeom prst="rect">
             <a:avLst/>
@@ -17233,12 +18234,24 @@
               <a:rPr lang="en-US" dirty="0">
                 <a:latin typeface="Consolas" panose="020B0609020204030204" pitchFamily="49" charset="0"/>
               </a:rPr>
-              <a:t>  --image devopsulpgc.azurecr.io/</a:t>
+              <a:t>  --image </a:t>
             </a:r>
             <a:r>
               <a:rPr lang="en-US" dirty="0" err="1">
                 <a:latin typeface="Consolas" panose="020B0609020204030204" pitchFamily="49" charset="0"/>
               </a:rPr>
+              <a:t>devopsulpgc</a:t>
+            </a:r>
+            <a:r>
+              <a:rPr lang="en-US" dirty="0">
+                <a:latin typeface="Consolas" panose="020B0609020204030204" pitchFamily="49" charset="0"/>
+              </a:rPr>
+              <a:t>&lt;username&gt;.azurecr.io/</a:t>
+            </a:r>
+            <a:r>
+              <a:rPr lang="en-US" dirty="0" err="1">
+                <a:latin typeface="Consolas" panose="020B0609020204030204" pitchFamily="49" charset="0"/>
+              </a:rPr>
               <a:t>inetel</a:t>
             </a:r>
             <a:r>
@@ -17281,7 +18294,19 @@
               <a:rPr lang="en-US" dirty="0">
                 <a:latin typeface="Consolas" panose="020B0609020204030204" pitchFamily="49" charset="0"/>
               </a:rPr>
-              <a:t>  --registry-server devopsulpgc.azurecr.io \</a:t>
+              <a:t>  --registry-server </a:t>
+            </a:r>
+            <a:r>
+              <a:rPr lang="en-US" dirty="0" err="1">
+                <a:latin typeface="Consolas" panose="020B0609020204030204" pitchFamily="49" charset="0"/>
+              </a:rPr>
+              <a:t>devopsulpgc</a:t>
+            </a:r>
+            <a:r>
+              <a:rPr lang="en-US" dirty="0">
+                <a:latin typeface="Consolas" panose="020B0609020204030204" pitchFamily="49" charset="0"/>
+              </a:rPr>
+              <a:t>&lt;username&gt;.azurecr.io \</a:t>
             </a:r>
           </a:p>
           <a:p>
@@ -17316,7 +18341,7 @@
 </p:sld>
 </file>
 
-<file path=ppt/slides/slide39.xml><?xml version="1.0" encoding="utf-8"?>
+<file path=ppt/slides/slide41.xml><?xml version="1.0" encoding="utf-8"?>
 <p:sld xmlns:a="http://schemas.openxmlformats.org/drawingml/2006/main" xmlns:r="http://schemas.openxmlformats.org/officeDocument/2006/relationships" xmlns:p="http://schemas.openxmlformats.org/presentationml/2006/main">
   <p:cSld>
     <p:spTree>
@@ -17422,129 +18447,7 @@
 </p:sld>
 </file>
 
-<file path=ppt/slides/slide4.xml><?xml version="1.0" encoding="utf-8"?>
-<p:sld xmlns:a="http://schemas.openxmlformats.org/drawingml/2006/main" xmlns:r="http://schemas.openxmlformats.org/officeDocument/2006/relationships" xmlns:p="http://schemas.openxmlformats.org/presentationml/2006/main">
-  <p:cSld>
-    <p:spTree>
-      <p:nvGrpSpPr>
-        <p:cNvPr id="1" name=""/>
-        <p:cNvGrpSpPr/>
-        <p:nvPr/>
-      </p:nvGrpSpPr>
-      <p:grpSpPr>
-        <a:xfrm>
-          <a:off x="0" y="0"/>
-          <a:ext cx="0" cy="0"/>
-          <a:chOff x="0" y="0"/>
-          <a:chExt cx="0" cy="0"/>
-        </a:xfrm>
-      </p:grpSpPr>
-      <p:sp>
-        <p:nvSpPr>
-          <p:cNvPr id="2" name="Title 1">
-            <a:extLst>
-              <a:ext uri="{FF2B5EF4-FFF2-40B4-BE49-F238E27FC236}">
-                <a16:creationId xmlns:a16="http://schemas.microsoft.com/office/drawing/2014/main" id="{32D4F2CF-2B7A-B451-CD50-C627D75B618E}"/>
-              </a:ext>
-            </a:extLst>
-          </p:cNvPr>
-          <p:cNvSpPr>
-            <a:spLocks noGrp="1"/>
-          </p:cNvSpPr>
-          <p:nvPr>
-            <p:ph type="title"/>
-          </p:nvPr>
-        </p:nvSpPr>
-        <p:spPr/>
-        <p:txBody>
-          <a:bodyPr/>
-          <a:lstStyle/>
-          <a:p>
-            <a:r>
-              <a:rPr lang="es-ES" dirty="0"/>
-              <a:t>Características de </a:t>
-            </a:r>
-            <a:r>
-              <a:rPr lang="es-ES" dirty="0" err="1"/>
-              <a:t>cloud</a:t>
-            </a:r>
-            <a:r>
-              <a:rPr lang="es-ES" dirty="0"/>
-              <a:t> </a:t>
-            </a:r>
-            <a:r>
-              <a:rPr lang="es-ES" dirty="0" err="1"/>
-              <a:t>computing</a:t>
-            </a:r>
-            <a:endParaRPr lang="es-ES" dirty="0"/>
-          </a:p>
-        </p:txBody>
-      </p:sp>
-      <p:sp>
-        <p:nvSpPr>
-          <p:cNvPr id="3" name="Text Placeholder 2">
-            <a:extLst>
-              <a:ext uri="{FF2B5EF4-FFF2-40B4-BE49-F238E27FC236}">
-                <a16:creationId xmlns:a16="http://schemas.microsoft.com/office/drawing/2014/main" id="{1A333CAF-2264-57C8-C38C-F56D4266DA45}"/>
-              </a:ext>
-            </a:extLst>
-          </p:cNvPr>
-          <p:cNvSpPr>
-            <a:spLocks noGrp="1"/>
-          </p:cNvSpPr>
-          <p:nvPr>
-            <p:ph type="body" sz="quarter" idx="10"/>
-          </p:nvPr>
-        </p:nvSpPr>
-        <p:spPr/>
-        <p:txBody>
-          <a:bodyPr>
-            <a:normAutofit/>
-          </a:bodyPr>
-          <a:lstStyle/>
-          <a:p>
-            <a:r>
-              <a:rPr lang="en-US" dirty="0"/>
-              <a:t>Measured Service</a:t>
-            </a:r>
-          </a:p>
-          <a:p>
-            <a:pPr lvl="1"/>
-            <a:r>
-              <a:rPr lang="es-ES" dirty="0"/>
-              <a:t>El pago se realiza solo por los recursos realmente utilizados</a:t>
-            </a:r>
-          </a:p>
-          <a:p>
-            <a:pPr lvl="1"/>
-            <a:r>
-              <a:rPr lang="es-ES" dirty="0"/>
-              <a:t>La medición generalmente se realiza en alta resolución.</a:t>
-            </a:r>
-          </a:p>
-          <a:p>
-            <a:pPr lvl="1"/>
-            <a:r>
-              <a:rPr lang="es-ES" dirty="0"/>
-              <a:t>No es necesario invertir dinero en recursos no utilizados</a:t>
-            </a:r>
-          </a:p>
-        </p:txBody>
-      </p:sp>
-    </p:spTree>
-    <p:extLst>
-      <p:ext uri="{BB962C8B-B14F-4D97-AF65-F5344CB8AC3E}">
-        <p14:creationId xmlns:p14="http://schemas.microsoft.com/office/powerpoint/2010/main" val="2035947615"/>
-      </p:ext>
-    </p:extLst>
-  </p:cSld>
-  <p:clrMapOvr>
-    <a:masterClrMapping/>
-  </p:clrMapOvr>
-</p:sld>
-</file>
-
-<file path=ppt/slides/slide40.xml><?xml version="1.0" encoding="utf-8"?>
+<file path=ppt/slides/slide42.xml><?xml version="1.0" encoding="utf-8"?>
 <p:sld xmlns:a="http://schemas.openxmlformats.org/drawingml/2006/main" xmlns:r="http://schemas.openxmlformats.org/officeDocument/2006/relationships" xmlns:p="http://schemas.openxmlformats.org/presentationml/2006/main">
   <p:cSld>
     <p:spTree>
@@ -17770,13 +18673,13 @@
               <a:rPr lang="en-US" dirty="0" err="1">
                 <a:latin typeface="Consolas" panose="020B0609020204030204" pitchFamily="49" charset="0"/>
               </a:rPr>
-              <a:t>bookreview-bdd</a:t>
+              <a:t>bookreview</a:t>
             </a:r>
             <a:r>
               <a:rPr lang="en-US" dirty="0">
                 <a:latin typeface="Consolas" panose="020B0609020204030204" pitchFamily="49" charset="0"/>
               </a:rPr>
-              <a:t> \</a:t>
+              <a:t>-back \</a:t>
             </a:r>
           </a:p>
           <a:p>
@@ -17811,7 +18714,7 @@
 </p:sld>
 </file>
 
-<file path=ppt/slides/slide41.xml><?xml version="1.0" encoding="utf-8"?>
+<file path=ppt/slides/slide43.xml><?xml version="1.0" encoding="utf-8"?>
 <p:sld xmlns:a="http://schemas.openxmlformats.org/drawingml/2006/main" xmlns:r="http://schemas.openxmlformats.org/officeDocument/2006/relationships" xmlns:p="http://schemas.openxmlformats.org/presentationml/2006/main">
   <p:cSld>
     <p:spTree>
@@ -17900,7 +18803,7 @@
 </p:sld>
 </file>
 
-<file path=ppt/slides/slide42.xml><?xml version="1.0" encoding="utf-8"?>
+<file path=ppt/slides/slide44.xml><?xml version="1.0" encoding="utf-8"?>
 <p:sld xmlns:a="http://schemas.openxmlformats.org/drawingml/2006/main" xmlns:r="http://schemas.openxmlformats.org/officeDocument/2006/relationships" xmlns:p="http://schemas.openxmlformats.org/presentationml/2006/main">
   <p:cSld>
     <p:spTree>
@@ -18029,7 +18932,7 @@
 </p:sld>
 </file>
 
-<file path=ppt/slides/slide43.xml><?xml version="1.0" encoding="utf-8"?>
+<file path=ppt/slides/slide45.xml><?xml version="1.0" encoding="utf-8"?>
 <p:sld xmlns:a="http://schemas.openxmlformats.org/drawingml/2006/main" xmlns:r="http://schemas.openxmlformats.org/officeDocument/2006/relationships" xmlns:p="http://schemas.openxmlformats.org/presentationml/2006/main">
   <p:cSld>
     <p:spTree>
@@ -18198,7 +19101,7 @@
 </p:sld>
 </file>
 
-<file path=ppt/slides/slide44.xml><?xml version="1.0" encoding="utf-8"?>
+<file path=ppt/slides/slide46.xml><?xml version="1.0" encoding="utf-8"?>
 <p:sld xmlns:a="http://schemas.openxmlformats.org/drawingml/2006/main" xmlns:r="http://schemas.openxmlformats.org/officeDocument/2006/relationships" xmlns:p="http://schemas.openxmlformats.org/presentationml/2006/main">
   <p:cSld>
     <p:spTree>
@@ -18304,7 +19207,7 @@
 </p:sld>
 </file>
 
-<file path=ppt/slides/slide45.xml><?xml version="1.0" encoding="utf-8"?>
+<file path=ppt/slides/slide47.xml><?xml version="1.0" encoding="utf-8"?>
 <p:sld xmlns:a="http://schemas.openxmlformats.org/drawingml/2006/main" xmlns:r="http://schemas.openxmlformats.org/officeDocument/2006/relationships" xmlns:p="http://schemas.openxmlformats.org/presentationml/2006/main">
   <p:cSld>
     <p:spTree>
@@ -18410,7 +19313,7 @@
 </p:sld>
 </file>
 
-<file path=ppt/slides/slide46.xml><?xml version="1.0" encoding="utf-8"?>
+<file path=ppt/slides/slide48.xml><?xml version="1.0" encoding="utf-8"?>
 <p:sld xmlns:a="http://schemas.openxmlformats.org/drawingml/2006/main" xmlns:r="http://schemas.openxmlformats.org/officeDocument/2006/relationships" xmlns:p="http://schemas.openxmlformats.org/presentationml/2006/main">
   <p:cSld>
     <p:spTree>

</xml_diff>

<commit_message>
some more minor changes to container_apps slides
</commit_message>
<xml_diff>
--- a/ppt/container_apps-devops-ulpgc.pptx
+++ b/ppt/container_apps-devops-ulpgc.pptx
@@ -2546,7 +2546,7 @@
           <a:p>
             <a:fld id="{4A3B785F-1BCE-1A46-9CAA-77ACC7103834}" type="datetimeFigureOut">
               <a:rPr lang="es-ES" smtClean="0"/>
-              <a:t>21/02/2024</a:t>
+              <a:t>22/02/2024</a:t>
             </a:fld>
             <a:endParaRPr lang="es-ES" dirty="0"/>
           </a:p>
@@ -16898,283 +16898,6 @@
               <a:t>environment</a:t>
             </a:r>
             <a:endParaRPr lang="es-ES" dirty="0"/>
-          </a:p>
-        </p:txBody>
-      </p:sp>
-      <p:sp>
-        <p:nvSpPr>
-          <p:cNvPr id="5" name="TextBox 4">
-            <a:extLst>
-              <a:ext uri="{FF2B5EF4-FFF2-40B4-BE49-F238E27FC236}">
-                <a16:creationId xmlns:a16="http://schemas.microsoft.com/office/drawing/2014/main" id="{811AD458-105B-A888-523F-719377CAC17B}"/>
-              </a:ext>
-            </a:extLst>
-          </p:cNvPr>
-          <p:cNvSpPr txBox="1"/>
-          <p:nvPr/>
-        </p:nvSpPr>
-        <p:spPr>
-          <a:xfrm>
-            <a:off x="1847821" y="2908889"/>
-            <a:ext cx="5448358" cy="2893100"/>
-          </a:xfrm>
-          <a:prstGeom prst="rect">
-            <a:avLst/>
-          </a:prstGeom>
-          <a:noFill/>
-        </p:spPr>
-        <p:txBody>
-          <a:bodyPr wrap="square" rtlCol="0">
-            <a:spAutoFit/>
-          </a:bodyPr>
-          <a:lstStyle/>
-          <a:p>
-            <a:r>
-              <a:rPr lang="en-US" dirty="0" err="1">
-                <a:latin typeface="Consolas" panose="020B0609020204030204" pitchFamily="49" charset="0"/>
-              </a:rPr>
-              <a:t>az</a:t>
-            </a:r>
-            <a:r>
-              <a:rPr lang="en-US" dirty="0">
-                <a:latin typeface="Consolas" panose="020B0609020204030204" pitchFamily="49" charset="0"/>
-              </a:rPr>
-              <a:t> network </a:t>
-            </a:r>
-            <a:r>
-              <a:rPr lang="en-US" dirty="0" err="1">
-                <a:latin typeface="Consolas" panose="020B0609020204030204" pitchFamily="49" charset="0"/>
-              </a:rPr>
-              <a:t>vnet</a:t>
-            </a:r>
-            <a:r>
-              <a:rPr lang="en-US" dirty="0">
-                <a:latin typeface="Consolas" panose="020B0609020204030204" pitchFamily="49" charset="0"/>
-              </a:rPr>
-              <a:t> subnet update \</a:t>
-            </a:r>
-          </a:p>
-          <a:p>
-            <a:r>
-              <a:rPr lang="en-US" dirty="0">
-                <a:latin typeface="Consolas" panose="020B0609020204030204" pitchFamily="49" charset="0"/>
-              </a:rPr>
-              <a:t>  --resource-group </a:t>
-            </a:r>
-            <a:r>
-              <a:rPr lang="en-US" dirty="0" err="1">
-                <a:latin typeface="Consolas" panose="020B0609020204030204" pitchFamily="49" charset="0"/>
-              </a:rPr>
-              <a:t>devops-ulpgc</a:t>
-            </a:r>
-            <a:r>
-              <a:rPr lang="en-US" dirty="0">
-                <a:latin typeface="Consolas" panose="020B0609020204030204" pitchFamily="49" charset="0"/>
-              </a:rPr>
-              <a:t> \</a:t>
-            </a:r>
-          </a:p>
-          <a:p>
-            <a:r>
-              <a:rPr lang="en-US" dirty="0">
-                <a:latin typeface="Consolas" panose="020B0609020204030204" pitchFamily="49" charset="0"/>
-              </a:rPr>
-              <a:t>  --name </a:t>
-            </a:r>
-            <a:r>
-              <a:rPr lang="en-US" dirty="0" err="1">
-                <a:latin typeface="Consolas" panose="020B0609020204030204" pitchFamily="49" charset="0"/>
-              </a:rPr>
-              <a:t>containerapps</a:t>
-            </a:r>
-            <a:r>
-              <a:rPr lang="en-US" dirty="0">
-                <a:latin typeface="Consolas" panose="020B0609020204030204" pitchFamily="49" charset="0"/>
-              </a:rPr>
-              <a:t>-subnet \</a:t>
-            </a:r>
-          </a:p>
-          <a:p>
-            <a:r>
-              <a:rPr lang="en-US" dirty="0">
-                <a:latin typeface="Consolas" panose="020B0609020204030204" pitchFamily="49" charset="0"/>
-              </a:rPr>
-              <a:t>  --</a:t>
-            </a:r>
-            <a:r>
-              <a:rPr lang="en-US" dirty="0" err="1">
-                <a:latin typeface="Consolas" panose="020B0609020204030204" pitchFamily="49" charset="0"/>
-              </a:rPr>
-              <a:t>vnet</a:t>
-            </a:r>
-            <a:r>
-              <a:rPr lang="en-US" dirty="0">
-                <a:latin typeface="Consolas" panose="020B0609020204030204" pitchFamily="49" charset="0"/>
-              </a:rPr>
-              <a:t>-name </a:t>
-            </a:r>
-            <a:r>
-              <a:rPr lang="en-US" dirty="0" err="1">
-                <a:latin typeface="Consolas" panose="020B0609020204030204" pitchFamily="49" charset="0"/>
-              </a:rPr>
-              <a:t>containerapps-vnet</a:t>
-            </a:r>
-            <a:r>
-              <a:rPr lang="en-US" dirty="0">
-                <a:latin typeface="Consolas" panose="020B0609020204030204" pitchFamily="49" charset="0"/>
-              </a:rPr>
-              <a:t> \</a:t>
-            </a:r>
-          </a:p>
-          <a:p>
-            <a:r>
-              <a:rPr lang="en-US" dirty="0">
-                <a:latin typeface="Consolas" panose="020B0609020204030204" pitchFamily="49" charset="0"/>
-              </a:rPr>
-              <a:t>  --delegations </a:t>
-            </a:r>
-            <a:r>
-              <a:rPr lang="en-US" dirty="0" err="1">
-                <a:latin typeface="Consolas" panose="020B0609020204030204" pitchFamily="49" charset="0"/>
-              </a:rPr>
-              <a:t>Microsoft.App</a:t>
-            </a:r>
-            <a:r>
-              <a:rPr lang="en-US" dirty="0">
-                <a:latin typeface="Consolas" panose="020B0609020204030204" pitchFamily="49" charset="0"/>
-              </a:rPr>
-              <a:t>/environments</a:t>
-            </a:r>
-          </a:p>
-          <a:p>
-            <a:endParaRPr lang="en-US" dirty="0">
-              <a:latin typeface="Consolas" panose="020B0609020204030204" pitchFamily="49" charset="0"/>
-            </a:endParaRPr>
-          </a:p>
-          <a:p>
-            <a:r>
-              <a:rPr lang="en-US" dirty="0" err="1">
-                <a:latin typeface="Consolas" panose="020B0609020204030204" pitchFamily="49" charset="0"/>
-              </a:rPr>
-              <a:t>az</a:t>
-            </a:r>
-            <a:r>
-              <a:rPr lang="en-US" dirty="0">
-                <a:latin typeface="Consolas" panose="020B0609020204030204" pitchFamily="49" charset="0"/>
-              </a:rPr>
-              <a:t> </a:t>
-            </a:r>
-            <a:r>
-              <a:rPr lang="en-US" dirty="0" err="1">
-                <a:latin typeface="Consolas" panose="020B0609020204030204" pitchFamily="49" charset="0"/>
-              </a:rPr>
-              <a:t>containerapp</a:t>
-            </a:r>
-            <a:r>
-              <a:rPr lang="en-US" dirty="0">
-                <a:latin typeface="Consolas" panose="020B0609020204030204" pitchFamily="49" charset="0"/>
-              </a:rPr>
-              <a:t> env create \</a:t>
-            </a:r>
-          </a:p>
-          <a:p>
-            <a:r>
-              <a:rPr lang="en-US" dirty="0">
-                <a:latin typeface="Consolas" panose="020B0609020204030204" pitchFamily="49" charset="0"/>
-              </a:rPr>
-              <a:t>  --name </a:t>
-            </a:r>
-            <a:r>
-              <a:rPr lang="en-US" dirty="0" err="1">
-                <a:latin typeface="Consolas" panose="020B0609020204030204" pitchFamily="49" charset="0"/>
-              </a:rPr>
-              <a:t>devops-containerapps</a:t>
-            </a:r>
-            <a:r>
-              <a:rPr lang="en-US" dirty="0">
-                <a:latin typeface="Consolas" panose="020B0609020204030204" pitchFamily="49" charset="0"/>
-              </a:rPr>
-              <a:t> \</a:t>
-            </a:r>
-          </a:p>
-          <a:p>
-            <a:r>
-              <a:rPr lang="en-US" dirty="0">
-                <a:latin typeface="Consolas" panose="020B0609020204030204" pitchFamily="49" charset="0"/>
-              </a:rPr>
-              <a:t>  --resource-group </a:t>
-            </a:r>
-            <a:r>
-              <a:rPr lang="en-US" dirty="0" err="1">
-                <a:latin typeface="Consolas" panose="020B0609020204030204" pitchFamily="49" charset="0"/>
-              </a:rPr>
-              <a:t>devops-ulpgc</a:t>
-            </a:r>
-            <a:r>
-              <a:rPr lang="en-US" dirty="0">
-                <a:latin typeface="Consolas" panose="020B0609020204030204" pitchFamily="49" charset="0"/>
-              </a:rPr>
-              <a:t> \</a:t>
-            </a:r>
-          </a:p>
-          <a:p>
-            <a:r>
-              <a:rPr lang="en-US" dirty="0">
-                <a:latin typeface="Consolas" panose="020B0609020204030204" pitchFamily="49" charset="0"/>
-              </a:rPr>
-              <a:t>  --location </a:t>
-            </a:r>
-            <a:r>
-              <a:rPr lang="en-US" dirty="0" err="1">
-                <a:latin typeface="Consolas" panose="020B0609020204030204" pitchFamily="49" charset="0"/>
-              </a:rPr>
-              <a:t>northeurope</a:t>
-            </a:r>
-            <a:r>
-              <a:rPr lang="en-US" dirty="0">
-                <a:latin typeface="Consolas" panose="020B0609020204030204" pitchFamily="49" charset="0"/>
-              </a:rPr>
-              <a:t> \</a:t>
-            </a:r>
-          </a:p>
-          <a:p>
-            <a:r>
-              <a:rPr lang="en-US" dirty="0">
-                <a:latin typeface="Consolas" panose="020B0609020204030204" pitchFamily="49" charset="0"/>
-              </a:rPr>
-              <a:t>  --infrastructure-subnet-resource-id &lt;subnet-id&gt;</a:t>
-            </a:r>
-          </a:p>
-          <a:p>
-            <a:endParaRPr lang="en-US" dirty="0">
-              <a:latin typeface="Consolas" panose="020B0609020204030204" pitchFamily="49" charset="0"/>
-            </a:endParaRPr>
-          </a:p>
-          <a:p>
-            <a:r>
-              <a:rPr lang="en-US" dirty="0" err="1">
-                <a:latin typeface="Consolas" panose="020B0609020204030204" pitchFamily="49" charset="0"/>
-              </a:rPr>
-              <a:t>az</a:t>
-            </a:r>
-            <a:r>
-              <a:rPr lang="en-US" dirty="0">
-                <a:latin typeface="Consolas" panose="020B0609020204030204" pitchFamily="49" charset="0"/>
-              </a:rPr>
-              <a:t> </a:t>
-            </a:r>
-            <a:r>
-              <a:rPr lang="en-US" dirty="0" err="1">
-                <a:latin typeface="Consolas" panose="020B0609020204030204" pitchFamily="49" charset="0"/>
-              </a:rPr>
-              <a:t>containerapp</a:t>
-            </a:r>
-            <a:r>
-              <a:rPr lang="en-US" dirty="0">
-                <a:latin typeface="Consolas" panose="020B0609020204030204" pitchFamily="49" charset="0"/>
-              </a:rPr>
-              <a:t> env list</a:t>
-            </a:r>
           </a:p>
         </p:txBody>
       </p:sp>
@@ -22458,6 +22181,15 @@
 </file>
 
 <file path=customXml/item1.xml><?xml version="1.0" encoding="utf-8"?>
+<?mso-contentType ?>
+<FormTemplates xmlns="http://schemas.microsoft.com/sharepoint/v3/contenttype/forms">
+  <Display>DocumentLibraryForm</Display>
+  <Edit>DocumentLibraryForm</Edit>
+  <New>DocumentLibraryForm</New>
+</FormTemplates>
+</file>
+
+<file path=customXml/item2.xml><?xml version="1.0" encoding="utf-8"?>
 <ct:contentTypeSchema xmlns:ct="http://schemas.microsoft.com/office/2006/metadata/contentType" xmlns:ma="http://schemas.microsoft.com/office/2006/metadata/properties/metaAttributes" ct:_="" ma:_="" ma:contentTypeName="Document" ma:contentTypeID="0x0101006B1E11B541137C48AA3727DCBBA54C16" ma:contentTypeVersion="11" ma:contentTypeDescription="Create a new document." ma:contentTypeScope="" ma:versionID="22726bcbd02ead97a4f48eaa43fc153c">
   <xsd:schema xmlns:xsd="http://www.w3.org/2001/XMLSchema" xmlns:xs="http://www.w3.org/2001/XMLSchema" xmlns:p="http://schemas.microsoft.com/office/2006/metadata/properties" xmlns:ns2="e202ecef-a3f6-4d98-ad9b-1b77cdb87b84" xmlns:ns3="435026e9-b5d0-4467-bbd9-3b76a09ae0c4" targetNamespace="http://schemas.microsoft.com/office/2006/metadata/properties" ma:root="true" ma:fieldsID="a9963dbee1a6a1e2273a745be13355f4" ns2:_="" ns3:_="">
     <xsd:import namespace="e202ecef-a3f6-4d98-ad9b-1b77cdb87b84"/>
@@ -22652,7 +22384,7 @@
 </ct:contentTypeSchema>
 </file>
 
-<file path=customXml/item2.xml><?xml version="1.0" encoding="utf-8"?>
+<file path=customXml/item3.xml><?xml version="1.0" encoding="utf-8"?>
 <p:properties xmlns:p="http://schemas.microsoft.com/office/2006/metadata/properties" xmlns:xsi="http://www.w3.org/2001/XMLSchema-instance" xmlns:pc="http://schemas.microsoft.com/office/infopath/2007/PartnerControls">
   <documentManagement>
     <TaxCatchAll xmlns="435026e9-b5d0-4467-bbd9-3b76a09ae0c4" xsi:nil="true"/>
@@ -22663,16 +22395,15 @@
 </p:properties>
 </file>
 
-<file path=customXml/item3.xml><?xml version="1.0" encoding="utf-8"?>
-<?mso-contentType ?>
-<FormTemplates xmlns="http://schemas.microsoft.com/sharepoint/v3/contenttype/forms">
-  <Display>DocumentLibraryForm</Display>
-  <Edit>DocumentLibraryForm</Edit>
-  <New>DocumentLibraryForm</New>
-</FormTemplates>
+<file path=customXml/itemProps1.xml><?xml version="1.0" encoding="utf-8"?>
+<ds:datastoreItem xmlns:ds="http://schemas.openxmlformats.org/officeDocument/2006/customXml" ds:itemID="{A4B54BEA-998E-408D-BCCD-09BA67DF44CE}">
+  <ds:schemaRefs>
+    <ds:schemaRef ds:uri="http://schemas.microsoft.com/sharepoint/v3/contenttype/forms"/>
+  </ds:schemaRefs>
+</ds:datastoreItem>
 </file>
 
-<file path=customXml/itemProps1.xml><?xml version="1.0" encoding="utf-8"?>
+<file path=customXml/itemProps2.xml><?xml version="1.0" encoding="utf-8"?>
 <ds:datastoreItem xmlns:ds="http://schemas.openxmlformats.org/officeDocument/2006/customXml" ds:itemID="{D46C44D0-CF75-4139-A44D-B7FAB2B5E9A1}">
   <ds:schemaRefs>
     <ds:schemaRef ds:uri="http://schemas.microsoft.com/office/2006/metadata/contentType"/>
@@ -22691,7 +22422,7 @@
 </ds:datastoreItem>
 </file>
 
-<file path=customXml/itemProps2.xml><?xml version="1.0" encoding="utf-8"?>
+<file path=customXml/itemProps3.xml><?xml version="1.0" encoding="utf-8"?>
 <ds:datastoreItem xmlns:ds="http://schemas.openxmlformats.org/officeDocument/2006/customXml" ds:itemID="{2F6D6B62-92C6-4EDE-B50E-8B81CFF669EA}">
   <ds:schemaRefs>
     <ds:schemaRef ds:uri="http://schemas.microsoft.com/office/2006/metadata/properties"/>
@@ -22700,12 +22431,4 @@
     <ds:schemaRef ds:uri="e202ecef-a3f6-4d98-ad9b-1b77cdb87b84"/>
   </ds:schemaRefs>
 </ds:datastoreItem>
-</file>
-
-<file path=customXml/itemProps3.xml><?xml version="1.0" encoding="utf-8"?>
-<ds:datastoreItem xmlns:ds="http://schemas.openxmlformats.org/officeDocument/2006/customXml" ds:itemID="{A4B54BEA-998E-408D-BCCD-09BA67DF44CE}">
-  <ds:schemaRefs>
-    <ds:schemaRef ds:uri="http://schemas.microsoft.com/sharepoint/v3/contenttype/forms"/>
-  </ds:schemaRefs>
-</ds:datastoreItem>
 </file>
</xml_diff>